<commit_message>
added homeowrk due week 3
</commit_message>
<xml_diff>
--- a/slides/week2_day2.pptx
+++ b/slides/week2_day2.pptx
@@ -5,10 +5,10 @@
     <p:sldMasterId id="2147483648" r:id="rId1"/>
   </p:sldMasterIdLst>
   <p:notesMasterIdLst>
-    <p:notesMasterId r:id="rId27"/>
+    <p:notesMasterId r:id="rId28"/>
   </p:notesMasterIdLst>
   <p:handoutMasterIdLst>
-    <p:handoutMasterId r:id="rId28"/>
+    <p:handoutMasterId r:id="rId29"/>
   </p:handoutMasterIdLst>
   <p:sldIdLst>
     <p:sldId id="281" r:id="rId2"/>
@@ -25,17 +25,18 @@
     <p:sldId id="326" r:id="rId13"/>
     <p:sldId id="327" r:id="rId14"/>
     <p:sldId id="328" r:id="rId15"/>
-    <p:sldId id="329" r:id="rId16"/>
-    <p:sldId id="315" r:id="rId17"/>
-    <p:sldId id="300" r:id="rId18"/>
-    <p:sldId id="301" r:id="rId19"/>
-    <p:sldId id="302" r:id="rId20"/>
-    <p:sldId id="303" r:id="rId21"/>
-    <p:sldId id="304" r:id="rId22"/>
-    <p:sldId id="305" r:id="rId23"/>
-    <p:sldId id="307" r:id="rId24"/>
-    <p:sldId id="308" r:id="rId25"/>
-    <p:sldId id="309" r:id="rId26"/>
+    <p:sldId id="330" r:id="rId16"/>
+    <p:sldId id="329" r:id="rId17"/>
+    <p:sldId id="315" r:id="rId18"/>
+    <p:sldId id="300" r:id="rId19"/>
+    <p:sldId id="301" r:id="rId20"/>
+    <p:sldId id="302" r:id="rId21"/>
+    <p:sldId id="303" r:id="rId22"/>
+    <p:sldId id="304" r:id="rId23"/>
+    <p:sldId id="305" r:id="rId24"/>
+    <p:sldId id="307" r:id="rId25"/>
+    <p:sldId id="308" r:id="rId26"/>
+    <p:sldId id="309" r:id="rId27"/>
   </p:sldIdLst>
   <p:sldSz cx="9144000" cy="6858000" type="screen4x3"/>
   <p:notesSz cx="6858000" cy="9144000"/>
@@ -4483,13 +4484,6 @@
               <a:t>4) what conference they go to or want to go to, what are the most prestigious journals/conferences in their field/sub-field </a:t>
             </a:r>
           </a:p>
-          <a:p>
-            <a:r>
-              <a:rPr lang="en-US" dirty="0" smtClean="0"/>
-              <a:t>5) make a short (5-10 minute?) video out of these interviews. only requirement: it must not be boring. </a:t>
-            </a:r>
-            <a:endParaRPr lang="en-US" dirty="0"/>
-          </a:p>
         </p:txBody>
       </p:sp>
     </p:spTree>
@@ -4535,11 +4529,7 @@
           <a:bodyPr/>
           <a:lstStyle/>
           <a:p>
-            <a:r>
-              <a:rPr lang="en-US" dirty="0" smtClean="0"/>
-              <a:t>Homework (due Tuesday)</a:t>
-            </a:r>
-            <a:endParaRPr lang="en-US" dirty="0"/>
+            <a:endParaRPr lang="en-US"/>
           </a:p>
         </p:txBody>
       </p:sp>
@@ -4560,31 +4550,50 @@
           <a:p>
             <a:r>
               <a:rPr lang="en-US" dirty="0" smtClean="0"/>
-              <a:t>Investigate possible journals that have </a:t>
-            </a:r>
+              <a:t>5)</a:t>
+            </a:r>
+            <a:r>
+              <a:rPr lang="en-US" dirty="0" smtClean="0"/>
+              <a:t> short </a:t>
+            </a:r>
+            <a:r>
+              <a:rPr lang="en-US" dirty="0" smtClean="0"/>
+              <a:t>(5-10 minute?)</a:t>
+            </a:r>
+            <a:r>
+              <a:rPr lang="en-US" dirty="0" smtClean="0"/>
+              <a:t> presentation.</a:t>
+            </a:r>
+          </a:p>
+          <a:p>
+            <a:endParaRPr lang="en-US" dirty="0" smtClean="0"/>
+          </a:p>
+          <a:p>
+            <a:r>
+              <a:rPr lang="en-US" dirty="0" smtClean="0"/>
+              <a:t>a) post a blog summarizing your interview, what you learned, what was interesting, etc.</a:t>
+            </a:r>
+          </a:p>
+          <a:p>
+            <a:endParaRPr lang="en-US" dirty="0" smtClean="0"/>
+          </a:p>
+          <a:p>
             <a:r>
               <a:rPr lang="en-US" dirty="0" err="1" smtClean="0"/>
-              <a:t>CFPs</a:t>
-            </a:r>
-            <a:r>
-              <a:rPr lang="en-US" dirty="0" smtClean="0"/>
-              <a:t> within the time frame of this class.</a:t>
-            </a:r>
-          </a:p>
-          <a:p>
-            <a:endParaRPr lang="en-US" dirty="0" smtClean="0"/>
-          </a:p>
-          <a:p>
-            <a:r>
-              <a:rPr lang="en-US" dirty="0" smtClean="0"/>
-              <a:t>Write a blog about at least 3 of them, why they look interesting, why your work would be relevant to those audiences, i.e. evaluate them in relation to your own interests and </a:t>
-            </a:r>
-            <a:r>
-              <a:rPr lang="en-US" smtClean="0"/>
-              <a:t>research agendas.</a:t>
-            </a:r>
-          </a:p>
-          <a:p>
+              <a:t>b</a:t>
+            </a:r>
+            <a:r>
+              <a:rPr lang="en-US" dirty="0" smtClean="0"/>
+              <a:t>) make video </a:t>
+            </a:r>
+            <a:r>
+              <a:rPr lang="en-US" dirty="0" smtClean="0"/>
+              <a:t>out of these interviews. only requirement: it must not be boring</a:t>
+            </a:r>
+            <a:r>
+              <a:rPr lang="en-US" dirty="0" smtClean="0"/>
+              <a:t>. doesn't have to be comprehensive, professional, be well-lit, etc. can just use one of the interviewees or all three. can include yourself or just the interviewees. </a:t>
+            </a:r>
             <a:endParaRPr lang="en-US" dirty="0" smtClean="0"/>
           </a:p>
           <a:p>
@@ -4637,7 +4646,7 @@
           <a:p>
             <a:r>
               <a:rPr lang="en-US" dirty="0" smtClean="0"/>
-              <a:t>Presentation Exercise</a:t>
+              <a:t>Homework (due Tuesday)</a:t>
             </a:r>
             <a:endParaRPr lang="en-US" dirty="0"/>
           </a:p>
@@ -4660,85 +4669,41 @@
           <a:p>
             <a:r>
               <a:rPr lang="en-US" dirty="0" smtClean="0"/>
-              <a:t> </a:t>
-            </a:r>
-          </a:p>
-          <a:p>
-            <a:r>
-              <a:rPr lang="en-US" dirty="0" smtClean="0"/>
-              <a:t>10 </a:t>
-            </a:r>
-            <a:r>
-              <a:rPr lang="en-US" dirty="0" smtClean="0"/>
-              <a:t>minutes to prepare a 3-minute</a:t>
-            </a:r>
+              <a:t>Investigate possible journals that have </a:t>
+            </a:r>
+            <a:r>
+              <a:rPr lang="en-US" dirty="0" err="1" smtClean="0"/>
+              <a:t>CFPs</a:t>
+            </a:r>
+            <a:r>
+              <a:rPr lang="en-US" dirty="0" smtClean="0"/>
+              <a:t> within the time frame of this class.</a:t>
+            </a:r>
+          </a:p>
+          <a:p>
             <a:r>
               <a:rPr lang="en-US" dirty="0" smtClean="0"/>
               <a:t> </a:t>
             </a:r>
-            <a:r>
-              <a:rPr lang="en-US" dirty="0" err="1" smtClean="0"/>
-              <a:t>Powerpoint</a:t>
-            </a:r>
-            <a:r>
-              <a:rPr lang="en-US" dirty="0" smtClean="0"/>
-              <a:t>. Include things such as:</a:t>
-            </a:r>
-          </a:p>
-          <a:p>
-            <a:r>
-              <a:rPr lang="en-US" dirty="0" smtClean="0"/>
-              <a:t>		Your main point, Why </a:t>
-            </a:r>
-            <a:r>
-              <a:rPr lang="en-US" dirty="0" smtClean="0"/>
-              <a:t>it's </a:t>
-            </a:r>
-            <a:r>
-              <a:rPr lang="en-US" dirty="0" smtClean="0"/>
-              <a:t>important, Why </a:t>
-            </a:r>
-            <a:r>
-              <a:rPr lang="en-US" dirty="0" smtClean="0"/>
-              <a:t>audience should </a:t>
-            </a:r>
-            <a:r>
-              <a:rPr lang="en-US" dirty="0" smtClean="0"/>
-              <a:t>care, Quotes, Graphics, Bullet points, etc </a:t>
+          </a:p>
+          <a:p>
+            <a:r>
+              <a:rPr lang="en-US" dirty="0" smtClean="0"/>
+              <a:t>Post </a:t>
+            </a:r>
+            <a:r>
+              <a:rPr lang="en-US" smtClean="0"/>
+              <a:t>an entry about </a:t>
+            </a:r>
+            <a:r>
+              <a:rPr lang="en-US" dirty="0" smtClean="0"/>
+              <a:t>at least 3 of them, why they look interesting, why your work would be relevant to those audiences, i.e. evaluate them in relation to your own interests and research agendas.</a:t>
             </a:r>
           </a:p>
           <a:p>
             <a:endParaRPr lang="en-US" dirty="0" smtClean="0"/>
           </a:p>
           <a:p>
-            <a:r>
-              <a:rPr lang="en-US" dirty="0" smtClean="0"/>
-              <a:t>For </a:t>
-            </a:r>
-            <a:r>
-              <a:rPr lang="en-US" dirty="0" smtClean="0"/>
-              <a:t>the people who are not presenting, evaluate them according to different criteria and explain why you think that criteria is important. </a:t>
-            </a:r>
-            <a:r>
-              <a:rPr lang="en-US" dirty="0" smtClean="0"/>
-              <a:t> </a:t>
-            </a:r>
-            <a:r>
-              <a:rPr lang="en-US" dirty="0" err="1" smtClean="0"/>
-              <a:t>e,g</a:t>
-            </a:r>
-            <a:r>
-              <a:rPr lang="en-US" dirty="0" smtClean="0"/>
-              <a:t>.. </a:t>
-            </a:r>
-            <a:r>
-              <a:rPr lang="en-US" dirty="0" smtClean="0"/>
-              <a:t>relevance, creativity, originality, concept, clarity, speaking</a:t>
-            </a:r>
-            <a:r>
-              <a:rPr lang="en-US" dirty="0" smtClean="0"/>
-              <a:t> prowess... These will be anonymous, btw</a:t>
-            </a:r>
             <a:endParaRPr lang="en-US" dirty="0"/>
           </a:p>
         </p:txBody>
@@ -4751,13 +4716,6 @@
   <p:transition spd="slow" advClick="0" advTm="3000">
     <p:fade/>
   </p:transition>
-  <p:timing>
-    <p:tnLst>
-      <p:par>
-        <p:cTn id="1" dur="indefinite" restart="never" nodeType="tmRoot"/>
-      </p:par>
-    </p:tnLst>
-  </p:timing>
 </p:sld>
 </file>
 
@@ -4793,7 +4751,11 @@
           <a:bodyPr/>
           <a:lstStyle/>
           <a:p>
-            <a:endParaRPr lang="en-US"/>
+            <a:r>
+              <a:rPr lang="en-US" dirty="0" smtClean="0"/>
+              <a:t>Presentation Exercise</a:t>
+            </a:r>
+            <a:endParaRPr lang="en-US" dirty="0"/>
           </a:p>
         </p:txBody>
       </p:sp>
@@ -4814,7 +4776,51 @@
           <a:p>
             <a:r>
               <a:rPr lang="en-US" dirty="0" smtClean="0"/>
-              <a:t>Patterns of presentation...</a:t>
+              <a:t> </a:t>
+            </a:r>
+          </a:p>
+          <a:p>
+            <a:r>
+              <a:rPr lang="en-US" dirty="0" smtClean="0"/>
+              <a:t>10 </a:t>
+            </a:r>
+            <a:r>
+              <a:rPr lang="en-US" dirty="0" smtClean="0"/>
+              <a:t>minutes to prepare a 3-minute</a:t>
+            </a:r>
+            <a:r>
+              <a:rPr lang="en-US" dirty="0" smtClean="0"/>
+              <a:t> </a:t>
+            </a:r>
+            <a:r>
+              <a:rPr lang="en-US" dirty="0" err="1" smtClean="0"/>
+              <a:t>Powerpoint</a:t>
+            </a:r>
+            <a:r>
+              <a:rPr lang="en-US" dirty="0" smtClean="0"/>
+              <a:t>. Include things such as:</a:t>
+            </a:r>
+          </a:p>
+          <a:p>
+            <a:r>
+              <a:rPr lang="en-US" dirty="0" smtClean="0"/>
+              <a:t>		Your main point, Why </a:t>
+            </a:r>
+            <a:r>
+              <a:rPr lang="en-US" dirty="0" smtClean="0"/>
+              <a:t>it's </a:t>
+            </a:r>
+            <a:r>
+              <a:rPr lang="en-US" dirty="0" smtClean="0"/>
+              <a:t>important, Why </a:t>
+            </a:r>
+            <a:r>
+              <a:rPr lang="en-US" dirty="0" smtClean="0"/>
+              <a:t>audience should </a:t>
+            </a:r>
+            <a:r>
+              <a:rPr lang="en-US" dirty="0" smtClean="0"/>
+              <a:t>care, Quotes, Graphics, Bullet points, etc </a:t>
             </a:r>
           </a:p>
           <a:p>
@@ -4823,53 +4829,32 @@
           <a:p>
             <a:r>
               <a:rPr lang="en-US" dirty="0" smtClean="0"/>
-              <a:t>Similar to Design Patterns in </a:t>
-            </a:r>
-            <a:r>
-              <a:rPr lang="en-US" dirty="0" smtClean="0"/>
-              <a:t>s</a:t>
-            </a:r>
-            <a:r>
-              <a:rPr lang="en-US" dirty="0" smtClean="0"/>
-              <a:t>oftware engineering.</a:t>
-            </a:r>
-          </a:p>
-          <a:p>
-            <a:endParaRPr lang="en-US" dirty="0" smtClean="0"/>
-          </a:p>
-          <a:p>
-            <a:r>
-              <a:rPr lang="en-US" dirty="0" smtClean="0"/>
-              <a:t>R</a:t>
-            </a:r>
-            <a:r>
-              <a:rPr lang="en-US" dirty="0" smtClean="0"/>
-              <a:t>ead papers in journals in your field.</a:t>
-            </a:r>
-          </a:p>
-          <a:p>
-            <a:r>
-              <a:rPr lang="en-US" dirty="0" smtClean="0"/>
-              <a:t>	</a:t>
-            </a:r>
-            <a:r>
-              <a:rPr lang="en-US" dirty="0" smtClean="0"/>
-              <a:t>How are they framing their arguments?</a:t>
-            </a:r>
-          </a:p>
-          <a:p>
-            <a:endParaRPr lang="en-US" dirty="0" smtClean="0"/>
-          </a:p>
-          <a:p>
-            <a:r>
-              <a:rPr lang="en-US" dirty="0" smtClean="0"/>
-              <a:t>	Claim: There are a finite number of strategies for each field. ... (?)</a:t>
-            </a:r>
-          </a:p>
-          <a:p>
-            <a:endParaRPr lang="en-US" dirty="0" smtClean="0"/>
-          </a:p>
-          <a:p>
+              <a:t>For </a:t>
+            </a:r>
+            <a:r>
+              <a:rPr lang="en-US" dirty="0" smtClean="0"/>
+              <a:t>the people who are not presenting, evaluate them according to different criteria and explain why you think that criteria is important. </a:t>
+            </a:r>
+            <a:r>
+              <a:rPr lang="en-US" dirty="0" smtClean="0"/>
+              <a:t> </a:t>
+            </a:r>
+            <a:r>
+              <a:rPr lang="en-US" dirty="0" err="1" smtClean="0"/>
+              <a:t>e,g</a:t>
+            </a:r>
+            <a:r>
+              <a:rPr lang="en-US" dirty="0" smtClean="0"/>
+              <a:t>.. </a:t>
+            </a:r>
+            <a:r>
+              <a:rPr lang="en-US" dirty="0" smtClean="0"/>
+              <a:t>relevance, creativity, originality, concept, clarity, speaking</a:t>
+            </a:r>
+            <a:r>
+              <a:rPr lang="en-US" dirty="0" smtClean="0"/>
+              <a:t> prowess... These will be anonymous, btw</a:t>
+            </a:r>
             <a:endParaRPr lang="en-US" dirty="0"/>
           </a:p>
         </p:txBody>
@@ -4943,16 +4928,59 @@
           <a:bodyPr/>
           <a:lstStyle/>
           <a:p>
+            <a:r>
+              <a:rPr lang="en-US" dirty="0" smtClean="0"/>
+              <a:t>Patterns of presentation...</a:t>
+            </a:r>
+          </a:p>
+          <a:p>
             <a:endParaRPr lang="en-US" dirty="0" smtClean="0"/>
           </a:p>
           <a:p>
             <a:r>
               <a:rPr lang="en-US" dirty="0" smtClean="0"/>
-              <a:t>Homework: skim/read a number of articles and try to identify as many "paper patterns" as you can. Look for overarching patterns as well as specific patterns. Why are these patterns used? Are they effective?</a:t>
+              <a:t>Similar to Design Patterns in </a:t>
+            </a:r>
+            <a:r>
+              <a:rPr lang="en-US" dirty="0" smtClean="0"/>
+              <a:t>s</a:t>
+            </a:r>
+            <a:r>
+              <a:rPr lang="en-US" dirty="0" smtClean="0"/>
+              <a:t>oftware engineering.</a:t>
             </a:r>
           </a:p>
           <a:p>
             <a:endParaRPr lang="en-US" dirty="0" smtClean="0"/>
+          </a:p>
+          <a:p>
+            <a:r>
+              <a:rPr lang="en-US" dirty="0" smtClean="0"/>
+              <a:t>R</a:t>
+            </a:r>
+            <a:r>
+              <a:rPr lang="en-US" dirty="0" smtClean="0"/>
+              <a:t>ead papers in journals in your field.</a:t>
+            </a:r>
+          </a:p>
+          <a:p>
+            <a:r>
+              <a:rPr lang="en-US" dirty="0" smtClean="0"/>
+              <a:t>	</a:t>
+            </a:r>
+            <a:r>
+              <a:rPr lang="en-US" dirty="0" smtClean="0"/>
+              <a:t>How are they framing their arguments?</a:t>
+            </a:r>
+          </a:p>
+          <a:p>
+            <a:endParaRPr lang="en-US" dirty="0" smtClean="0"/>
+          </a:p>
+          <a:p>
+            <a:r>
+              <a:rPr lang="en-US" dirty="0" smtClean="0"/>
+              <a:t>	Claim: There are a finite number of strategies for each field. ... (?)</a:t>
+            </a:r>
           </a:p>
           <a:p>
             <a:endParaRPr lang="en-US" dirty="0" smtClean="0"/>
@@ -5036,34 +5064,7 @@
           <a:p>
             <a:r>
               <a:rPr lang="en-US" dirty="0" smtClean="0"/>
-              <a:t>Example of overarching pattern: Prototype project as example of potentially interesting research.</a:t>
-            </a:r>
-          </a:p>
-          <a:p>
-            <a:endParaRPr lang="en-US" dirty="0" smtClean="0"/>
-          </a:p>
-          <a:p>
-            <a:r>
-              <a:rPr lang="en-US" dirty="0" smtClean="0"/>
-              <a:t>Why effective? </a:t>
-            </a:r>
-          </a:p>
-          <a:p>
-            <a:endParaRPr lang="en-US" dirty="0" smtClean="0"/>
-          </a:p>
-          <a:p>
-            <a:r>
-              <a:rPr lang="en-US" dirty="0" smtClean="0"/>
-              <a:t>shows that your work is important to other people, has a scope beyond a particular project.</a:t>
-            </a:r>
-          </a:p>
-          <a:p>
-            <a:endParaRPr lang="en-US" dirty="0" smtClean="0"/>
-          </a:p>
-          <a:p>
-            <a:r>
-              <a:rPr lang="en-US" dirty="0" smtClean="0"/>
-              <a:t>takes pressure off of the project details -- it's just an intriguing prototype...</a:t>
+              <a:t>Homework: skim/read a number of articles and try to identify as many "paper patterns" as you can. Look for overarching patterns as well as specific patterns. Why are these patterns used? Are they effective?</a:t>
             </a:r>
           </a:p>
           <a:p>
@@ -5256,7 +5257,7 @@
           <a:p>
             <a:r>
               <a:rPr lang="en-US" dirty="0" smtClean="0"/>
-              <a:t>Example of specific pattern: Citing previous work and then subtly disparaging it as not being relevant to an important task.</a:t>
+              <a:t>Example of overarching pattern: Prototype project as example of potentially interesting research.</a:t>
             </a:r>
           </a:p>
           <a:p>
@@ -5274,29 +5275,17 @@
           <a:p>
             <a:r>
               <a:rPr lang="en-US" dirty="0" smtClean="0"/>
-              <a:t>Shows you are familiar with the field. </a:t>
-            </a:r>
-          </a:p>
-          <a:p>
-            <a:r>
-              <a:rPr lang="en-US" dirty="0" smtClean="0"/>
-              <a:t>Shows that know why specifically your work is important.</a:t>
-            </a:r>
-          </a:p>
-          <a:p>
-            <a:r>
-              <a:rPr lang="en-US" dirty="0" smtClean="0"/>
-              <a:t>Raises expectations that you will demonstrate relevance.</a:t>
-            </a:r>
-          </a:p>
-          <a:p>
-            <a:r>
-              <a:rPr lang="en-US" dirty="0" smtClean="0"/>
-              <a:t>Creates a narrative interest via implied conflict. (?)</a:t>
+              <a:t>shows that your work is important to other people, has a scope beyond a particular project.</a:t>
             </a:r>
           </a:p>
           <a:p>
             <a:endParaRPr lang="en-US" dirty="0" smtClean="0"/>
+          </a:p>
+          <a:p>
+            <a:r>
+              <a:rPr lang="en-US" dirty="0" smtClean="0"/>
+              <a:t>takes pressure off of the project details -- it's just an intriguing prototype...</a:t>
+            </a:r>
           </a:p>
           <a:p>
             <a:endParaRPr lang="en-US" dirty="0" smtClean="0"/>
@@ -5378,38 +5367,12 @@
           <a:bodyPr/>
           <a:lstStyle/>
           <a:p>
-            <a:r>
-              <a:rPr lang="en-US" dirty="0" smtClean="0"/>
-              <a:t>In Rhetorical Analysis there is the dual concept of </a:t>
-            </a:r>
-          </a:p>
-          <a:p>
             <a:endParaRPr lang="en-US" dirty="0" smtClean="0"/>
           </a:p>
           <a:p>
             <a:r>
               <a:rPr lang="en-US" dirty="0" smtClean="0"/>
-              <a:t>making a </a:t>
-            </a:r>
-            <a:r>
-              <a:rPr lang="en-US" i="1" dirty="0" smtClean="0"/>
-              <a:t>claim</a:t>
-            </a:r>
-          </a:p>
-          <a:p>
-            <a:r>
-              <a:rPr lang="en-US" dirty="0" smtClean="0"/>
-              <a:t>      which implies </a:t>
-            </a:r>
-          </a:p>
-          <a:p>
-            <a:r>
-              <a:rPr lang="en-US" dirty="0" smtClean="0"/>
-              <a:t>          a </a:t>
-            </a:r>
-            <a:r>
-              <a:rPr lang="en-US" i="1" dirty="0" smtClean="0"/>
-              <a:t>burden of proof</a:t>
+              <a:t>Example of specific pattern: Citing previous work and then subtly disparaging it as not being relevant to an important task.</a:t>
             </a:r>
           </a:p>
           <a:p>
@@ -5418,13 +5381,7 @@
           <a:p>
             <a:r>
               <a:rPr lang="en-US" dirty="0" smtClean="0"/>
-              <a:t>What claims are you making? </a:t>
-            </a:r>
-          </a:p>
-          <a:p>
-            <a:r>
-              <a:rPr lang="en-US" dirty="0" smtClean="0"/>
-              <a:t>Why should people care about them?</a:t>
+              <a:t>Why effective? </a:t>
             </a:r>
           </a:p>
           <a:p>
@@ -5433,8 +5390,35 @@
           <a:p>
             <a:r>
               <a:rPr lang="en-US" dirty="0" smtClean="0"/>
-              <a:t>How can you back them up?</a:t>
-            </a:r>
+              <a:t>Shows you are familiar with the field. </a:t>
+            </a:r>
+          </a:p>
+          <a:p>
+            <a:r>
+              <a:rPr lang="en-US" dirty="0" smtClean="0"/>
+              <a:t>Shows that know why specifically your work is important.</a:t>
+            </a:r>
+          </a:p>
+          <a:p>
+            <a:r>
+              <a:rPr lang="en-US" dirty="0" smtClean="0"/>
+              <a:t>Raises expectations that you will demonstrate relevance.</a:t>
+            </a:r>
+          </a:p>
+          <a:p>
+            <a:r>
+              <a:rPr lang="en-US" dirty="0" smtClean="0"/>
+              <a:t>Creates a narrative interest via implied conflict. (?)</a:t>
+            </a:r>
+          </a:p>
+          <a:p>
+            <a:endParaRPr lang="en-US" dirty="0" smtClean="0"/>
+          </a:p>
+          <a:p>
+            <a:endParaRPr lang="en-US" dirty="0" smtClean="0"/>
+          </a:p>
+          <a:p>
+            <a:endParaRPr lang="en-US" dirty="0" smtClean="0"/>
           </a:p>
           <a:p>
             <a:endParaRPr lang="en-US" dirty="0"/>
@@ -5512,68 +5496,61 @@
           <a:p>
             <a:r>
               <a:rPr lang="en-US" dirty="0" smtClean="0"/>
-              <a:t>empirical studies</a:t>
-            </a:r>
-          </a:p>
-          <a:p>
-            <a:r>
-              <a:rPr lang="en-US" dirty="0" smtClean="0"/>
-              <a:t>logic</a:t>
-            </a:r>
-          </a:p>
-          <a:p>
-            <a:r>
-              <a:rPr lang="en-US" dirty="0" smtClean="0"/>
-              <a:t>quotes, citations</a:t>
-            </a:r>
-          </a:p>
-          <a:p>
-            <a:r>
-              <a:rPr lang="en-US" dirty="0" smtClean="0"/>
-              <a:t>charts</a:t>
-            </a:r>
-          </a:p>
-          <a:p>
-            <a:r>
-              <a:rPr lang="en-US" dirty="0" smtClean="0"/>
-              <a:t>images</a:t>
-            </a:r>
-          </a:p>
-          <a:p>
-            <a:r>
-              <a:rPr lang="en-US" dirty="0" smtClean="0"/>
-              <a:t>language tone (formal, jargon, amusing... etc)</a:t>
-            </a:r>
-          </a:p>
-          <a:p>
-            <a:r>
-              <a:rPr lang="en-US" dirty="0" smtClean="0"/>
-              <a:t>compare/contrast</a:t>
-            </a:r>
-          </a:p>
-          <a:p>
-            <a:r>
-              <a:rPr lang="en-US" dirty="0" smtClean="0"/>
-              <a:t>breadth/depth of analysis</a:t>
-            </a:r>
-          </a:p>
-          <a:p>
-            <a:r>
-              <a:rPr lang="en-US" dirty="0" smtClean="0"/>
-              <a:t>analogy, metaphor</a:t>
-            </a:r>
-          </a:p>
-          <a:p>
-            <a:r>
-              <a:rPr lang="en-US" dirty="0" smtClean="0"/>
-              <a:t>etc...</a:t>
+              <a:t>In Rhetorical Analysis there is the dual concept of </a:t>
             </a:r>
           </a:p>
           <a:p>
             <a:endParaRPr lang="en-US" dirty="0" smtClean="0"/>
           </a:p>
           <a:p>
+            <a:r>
+              <a:rPr lang="en-US" dirty="0" smtClean="0"/>
+              <a:t>making a </a:t>
+            </a:r>
+            <a:r>
+              <a:rPr lang="en-US" i="1" dirty="0" smtClean="0"/>
+              <a:t>claim</a:t>
+            </a:r>
+          </a:p>
+          <a:p>
+            <a:r>
+              <a:rPr lang="en-US" dirty="0" smtClean="0"/>
+              <a:t>      which implies </a:t>
+            </a:r>
+          </a:p>
+          <a:p>
+            <a:r>
+              <a:rPr lang="en-US" dirty="0" smtClean="0"/>
+              <a:t>          a </a:t>
+            </a:r>
+            <a:r>
+              <a:rPr lang="en-US" i="1" dirty="0" smtClean="0"/>
+              <a:t>burden of proof</a:t>
+            </a:r>
+          </a:p>
+          <a:p>
             <a:endParaRPr lang="en-US" dirty="0" smtClean="0"/>
+          </a:p>
+          <a:p>
+            <a:r>
+              <a:rPr lang="en-US" dirty="0" smtClean="0"/>
+              <a:t>What claims are you making? </a:t>
+            </a:r>
+          </a:p>
+          <a:p>
+            <a:r>
+              <a:rPr lang="en-US" dirty="0" smtClean="0"/>
+              <a:t>Why should people care about them?</a:t>
+            </a:r>
+          </a:p>
+          <a:p>
+            <a:endParaRPr lang="en-US" dirty="0" smtClean="0"/>
+          </a:p>
+          <a:p>
+            <a:r>
+              <a:rPr lang="en-US" dirty="0" smtClean="0"/>
+              <a:t>How can you back them up?</a:t>
+            </a:r>
           </a:p>
           <a:p>
             <a:endParaRPr lang="en-US" dirty="0"/>
@@ -5651,42 +5628,70 @@
           <a:p>
             <a:r>
               <a:rPr lang="en-US" dirty="0" smtClean="0"/>
-              <a:t>Homework</a:t>
+              <a:t>empirical studies</a:t>
+            </a:r>
+          </a:p>
+          <a:p>
+            <a:r>
+              <a:rPr lang="en-US" dirty="0" smtClean="0"/>
+              <a:t>logic</a:t>
+            </a:r>
+          </a:p>
+          <a:p>
+            <a:r>
+              <a:rPr lang="en-US" dirty="0" smtClean="0"/>
+              <a:t>quotes, citations</a:t>
+            </a:r>
+          </a:p>
+          <a:p>
+            <a:r>
+              <a:rPr lang="en-US" dirty="0" smtClean="0"/>
+              <a:t>charts</a:t>
+            </a:r>
+          </a:p>
+          <a:p>
+            <a:r>
+              <a:rPr lang="en-US" dirty="0" smtClean="0"/>
+              <a:t>images</a:t>
+            </a:r>
+          </a:p>
+          <a:p>
+            <a:r>
+              <a:rPr lang="en-US" dirty="0" smtClean="0"/>
+              <a:t>language tone (formal, jargon, amusing... etc)</a:t>
+            </a:r>
+          </a:p>
+          <a:p>
+            <a:r>
+              <a:rPr lang="en-US" dirty="0" smtClean="0"/>
+              <a:t>compare/contrast</a:t>
+            </a:r>
+          </a:p>
+          <a:p>
+            <a:r>
+              <a:rPr lang="en-US" dirty="0" smtClean="0"/>
+              <a:t>breadth/depth of analysis</a:t>
+            </a:r>
+          </a:p>
+          <a:p>
+            <a:r>
+              <a:rPr lang="en-US" dirty="0" smtClean="0"/>
+              <a:t>analogy, metaphor</a:t>
+            </a:r>
+          </a:p>
+          <a:p>
+            <a:r>
+              <a:rPr lang="en-US" dirty="0" smtClean="0"/>
+              <a:t>etc...</a:t>
             </a:r>
           </a:p>
           <a:p>
             <a:endParaRPr lang="en-US" dirty="0" smtClean="0"/>
           </a:p>
           <a:p>
-            <a:r>
-              <a:rPr lang="en-US" dirty="0" smtClean="0"/>
-              <a:t>1) find 10 "paper patterns" (both general and specific) from articles of your choice in fields you are interested in. Write a blog post describing them. Are they effective? Why or why not? Are they common? Are they only found in particular kinds of papers or particular fields? Cite and link to the papers you've skimmed/read.</a:t>
-            </a:r>
-          </a:p>
-          <a:p>
             <a:endParaRPr lang="en-US" dirty="0" smtClean="0"/>
           </a:p>
           <a:p>
-            <a:r>
-              <a:rPr lang="en-US" dirty="0" smtClean="0"/>
-              <a:t>1b) Bring to class 3 interesting papers that are less than 10 pages each. Print them out on PAPER and provide LINKS to a complete digital copy (</a:t>
-            </a:r>
-            <a:r>
-              <a:rPr lang="en-US" dirty="0" err="1" smtClean="0"/>
-              <a:t>ie</a:t>
-            </a:r>
-            <a:r>
-              <a:rPr lang="en-US" dirty="0" smtClean="0"/>
-              <a:t>, not behind a </a:t>
-            </a:r>
-            <a:r>
-              <a:rPr lang="en-US" dirty="0" err="1" smtClean="0"/>
-              <a:t>paywall</a:t>
-            </a:r>
-            <a:r>
-              <a:rPr lang="en-US" dirty="0" smtClean="0"/>
-              <a:t>). </a:t>
-            </a:r>
             <a:endParaRPr lang="en-US" dirty="0"/>
           </a:p>
         </p:txBody>
@@ -5766,41 +5771,39 @@
             </a:r>
           </a:p>
           <a:p>
-            <a:r>
-              <a:rPr lang="en-US" dirty="0" smtClean="0"/>
-              <a:t>2) Use your analytical skills to uncover the implicit or explicit philosophies of a particular author of an article. What is important/meaningful to the </a:t>
+            <a:endParaRPr lang="en-US" dirty="0" smtClean="0"/>
+          </a:p>
+          <a:p>
+            <a:r>
+              <a:rPr lang="en-US" dirty="0" smtClean="0"/>
+              <a:t>1) find 10 "paper patterns" (both general and specific) from articles of your choice in fields you are interested in. Write a blog post describing them. Are they effective? Why or why not? Are they common? Are they only found in particular kinds of papers or particular fields? Cite and link to the papers you've skimmed/read.</a:t>
+            </a:r>
+          </a:p>
+          <a:p>
+            <a:endParaRPr lang="en-US" dirty="0" smtClean="0"/>
+          </a:p>
+          <a:p>
+            <a:r>
+              <a:rPr lang="en-US" dirty="0" smtClean="0"/>
+              <a:t>1b) Bring to class 3 interesting papers that are less than 10 pages each. Print them out on PAPER and provide LINKS to a complete digital copy (</a:t>
             </a:r>
             <a:r>
               <a:rPr lang="en-US" dirty="0" err="1" smtClean="0"/>
-              <a:t>author(s</a:t>
-            </a:r>
-            <a:r>
-              <a:rPr lang="en-US" dirty="0" smtClean="0"/>
-              <a:t>)? Why are they important/meaningful to the </a:t>
+              <a:t>ie</a:t>
+            </a:r>
+            <a:r>
+              <a:rPr lang="en-US" dirty="0" smtClean="0"/>
+              <a:t>, not behind a </a:t>
             </a:r>
             <a:r>
               <a:rPr lang="en-US" dirty="0" err="1" smtClean="0"/>
-              <a:t>author(s</a:t>
-            </a:r>
-            <a:r>
-              <a:rPr lang="en-US" dirty="0" smtClean="0"/>
-              <a:t>)? </a:t>
-            </a:r>
-          </a:p>
-          <a:p>
-            <a:r>
-              <a:rPr lang="en-US" dirty="0" smtClean="0"/>
-              <a:t>Where in the article do you find it? What citations support your findings? What is the relationship between the philosophy and the field in general?</a:t>
-            </a:r>
-          </a:p>
-          <a:p>
-            <a:r>
-              <a:rPr lang="en-US" dirty="0" smtClean="0"/>
-              <a:t>Do you agree with the "tenets" of the author's outlook?</a:t>
-            </a:r>
-          </a:p>
-          <a:p>
-            <a:endParaRPr lang="en-US" dirty="0" smtClean="0"/>
+              <a:t>paywall</a:t>
+            </a:r>
+            <a:r>
+              <a:rPr lang="en-US" dirty="0" smtClean="0"/>
+              <a:t>). </a:t>
+            </a:r>
+            <a:endParaRPr lang="en-US" dirty="0"/>
           </a:p>
         </p:txBody>
       </p:sp>
@@ -5875,6 +5878,119 @@
           <a:p>
             <a:r>
               <a:rPr lang="en-US" dirty="0" smtClean="0"/>
+              <a:t>Homework</a:t>
+            </a:r>
+          </a:p>
+          <a:p>
+            <a:r>
+              <a:rPr lang="en-US" dirty="0" smtClean="0"/>
+              <a:t>2) Use your analytical skills to uncover the implicit or explicit philosophies of a particular author of an article. What is important/meaningful to the </a:t>
+            </a:r>
+            <a:r>
+              <a:rPr lang="en-US" dirty="0" err="1" smtClean="0"/>
+              <a:t>author(s</a:t>
+            </a:r>
+            <a:r>
+              <a:rPr lang="en-US" dirty="0" smtClean="0"/>
+              <a:t>)? Why are they important/meaningful to the </a:t>
+            </a:r>
+            <a:r>
+              <a:rPr lang="en-US" dirty="0" err="1" smtClean="0"/>
+              <a:t>author(s</a:t>
+            </a:r>
+            <a:r>
+              <a:rPr lang="en-US" dirty="0" smtClean="0"/>
+              <a:t>)? </a:t>
+            </a:r>
+          </a:p>
+          <a:p>
+            <a:r>
+              <a:rPr lang="en-US" dirty="0" smtClean="0"/>
+              <a:t>Where in the article do you find it? What citations support your findings? What is the relationship between the philosophy and the field in general?</a:t>
+            </a:r>
+          </a:p>
+          <a:p>
+            <a:r>
+              <a:rPr lang="en-US" dirty="0" smtClean="0"/>
+              <a:t>Do you agree with the "tenets" of the author's outlook?</a:t>
+            </a:r>
+          </a:p>
+          <a:p>
+            <a:endParaRPr lang="en-US" dirty="0" smtClean="0"/>
+          </a:p>
+        </p:txBody>
+      </p:sp>
+    </p:spTree>
+  </p:cSld>
+  <p:clrMapOvr>
+    <a:masterClrMapping/>
+  </p:clrMapOvr>
+  <p:transition spd="slow" advClick="0" advTm="3000">
+    <p:fade/>
+  </p:transition>
+  <p:timing>
+    <p:tnLst>
+      <p:par>
+        <p:cTn id="1" dur="indefinite" restart="never" nodeType="tmRoot"/>
+      </p:par>
+    </p:tnLst>
+  </p:timing>
+</p:sld>
+</file>
+
+<file path=ppt/slides/slide26.xml><?xml version="1.0" encoding="utf-8"?>
+<p:sld xmlns:a="http://schemas.openxmlformats.org/drawingml/2006/main" xmlns:r="http://schemas.openxmlformats.org/officeDocument/2006/relationships" xmlns:mc="http://schemas.openxmlformats.org/markup-compatibility/2006" xmlns:mv="urn:schemas-microsoft-com:mac:vml" xmlns:p="http://schemas.openxmlformats.org/presentationml/2006/main" mc:Ignorable="mv" mc:PreserveAttributes="mv:*">
+  <p:cSld>
+    <p:spTree>
+      <p:nvGrpSpPr>
+        <p:cNvPr id="1" name=""/>
+        <p:cNvGrpSpPr/>
+        <p:nvPr/>
+      </p:nvGrpSpPr>
+      <p:grpSpPr>
+        <a:xfrm>
+          <a:off x="0" y="0"/>
+          <a:ext cx="0" cy="0"/>
+          <a:chOff x="0" y="0"/>
+          <a:chExt cx="0" cy="0"/>
+        </a:xfrm>
+      </p:grpSpPr>
+      <p:sp>
+        <p:nvSpPr>
+          <p:cNvPr id="2" name="Title 1"/>
+          <p:cNvSpPr>
+            <a:spLocks noGrp="1"/>
+          </p:cNvSpPr>
+          <p:nvPr>
+            <p:ph type="title"/>
+          </p:nvPr>
+        </p:nvSpPr>
+        <p:spPr/>
+        <p:txBody>
+          <a:bodyPr/>
+          <a:lstStyle/>
+          <a:p>
+            <a:endParaRPr lang="en-US"/>
+          </a:p>
+        </p:txBody>
+      </p:sp>
+      <p:sp>
+        <p:nvSpPr>
+          <p:cNvPr id="3" name="Content Placeholder 2"/>
+          <p:cNvSpPr>
+            <a:spLocks noGrp="1"/>
+          </p:cNvSpPr>
+          <p:nvPr>
+            <p:ph idx="1"/>
+          </p:nvPr>
+        </p:nvSpPr>
+        <p:spPr/>
+        <p:txBody>
+          <a:bodyPr/>
+          <a:lstStyle/>
+          <a:p>
+            <a:r>
+              <a:rPr lang="en-US" dirty="0" smtClean="0"/>
               <a:t>Homework  2 cont) </a:t>
             </a:r>
           </a:p>
@@ -5976,7 +6092,7 @@
           <a:p>
             <a:r>
               <a:rPr lang="en-US" dirty="0" smtClean="0"/>
-              <a:t>1. Usually easier to start with a particular journal or particular article.</a:t>
+              <a:t>Usually easier to start with a particular journal or particular article.</a:t>
             </a:r>
           </a:p>
           <a:p>

</xml_diff>